<commit_message>
Added home route to Flask app, updated PPT
</commit_message>
<xml_diff>
--- a/FlaskESP32ConceptDemo.pptx
+++ b/FlaskESP32ConceptDemo.pptx
@@ -8314,7 +8314,7 @@
             </a:pPr>
             <a:r>
               <a:rPr lang="en-US" sz="3200" dirty="0"/>
-              <a:t>http://10.13.135.141:5000/potentiometer/human/&lt;some_value&gt;</a:t>
+              <a:t>http://10.17.154.215:5000/potentiometer/human/&lt;some_value&gt;</a:t>
             </a:r>
           </a:p>
           <a:p>
@@ -8331,7 +8331,15 @@
             </a:r>
             <a:r>
               <a:rPr lang="en-US" sz="3200" dirty="0" err="1"/>
-              <a:t>UPIoT</a:t>
+              <a:t>UPStudent</a:t>
+            </a:r>
+            <a:r>
+              <a:rPr lang="en-US" sz="3200" dirty="0"/>
+              <a:t> (if it’s </a:t>
+            </a:r>
+            <a:r>
+              <a:rPr lang="en-US" sz="3200"/>
+              <a:t>not already on it)</a:t>
             </a:r>
             <a:endParaRPr lang="en-US" sz="3200" dirty="0"/>
           </a:p>

</xml_diff>